<commit_message>
paths to walks in digraph & simple_graphs; slides6f
</commit_message>
<xml_diff>
--- a/spring11/slides11/slides6f.pptx
+++ b/spring11/slides11/slides6f.pptx
@@ -35,10 +35,10 @@
     <p:sldId id="381" r:id="rId23"/>
     <p:sldId id="285" r:id="rId24"/>
     <p:sldId id="337" r:id="rId25"/>
-    <p:sldId id="287" r:id="rId26"/>
-    <p:sldId id="338" r:id="rId27"/>
-    <p:sldId id="339" r:id="rId28"/>
-    <p:sldId id="292" r:id="rId29"/>
+    <p:sldId id="338" r:id="rId26"/>
+    <p:sldId id="339" r:id="rId27"/>
+    <p:sldId id="292" r:id="rId28"/>
+    <p:sldId id="287" r:id="rId29"/>
     <p:sldId id="293" r:id="rId30"/>
     <p:sldId id="374" r:id="rId31"/>
     <p:sldId id="294" r:id="rId32"/>
@@ -273,7 +273,7 @@
             <a:fld id="{7E67CB53-8D3C-47BE-A7FA-F662C961B657}" type="datetimeFigureOut">
               <a:rPr lang="en-US" smtClean="0"/>
               <a:pPr/>
-              <a:t>3/10/11</a:t>
+              <a:t>3/11/11</a:t>
             </a:fld>
             <a:endParaRPr lang="en-US"/>
           </a:p>
@@ -435,7 +435,7 @@
             <a:fld id="{EFF6E4C5-D825-46D1-9B47-4B12017997CB}" type="datetimeFigureOut">
               <a:rPr lang="en-US" smtClean="0"/>
               <a:pPr/>
-              <a:t>3/10/11</a:t>
+              <a:t>3/11/11</a:t>
             </a:fld>
             <a:endParaRPr lang="en-US"/>
           </a:p>
@@ -2163,7 +2163,7 @@
           <a:bodyPr/>
           <a:lstStyle/>
           <a:p>
-            <a:fld id="{C351C094-B5DB-4438-ADA9-FFFA6681FCCF}" type="slidenum">
+            <a:fld id="{6C280F22-40E1-47F9-BBD1-63255FC34830}" type="slidenum">
               <a:rPr lang="en-US"/>
               <a:pPr/>
               <a:t>25</a:t>
@@ -2174,7 +2174,7 @@
       </p:sp>
       <p:sp>
         <p:nvSpPr>
-          <p:cNvPr id="760834" name="Rectangle 2"/>
+          <p:cNvPr id="756738" name="Rectangle 2"/>
           <p:cNvSpPr>
             <a:spLocks noGrp="1" noRot="1" noChangeAspect="1" noChangeArrowheads="1" noTextEdit="1"/>
           </p:cNvSpPr>
@@ -2188,7 +2188,7 @@
       </p:sp>
       <p:sp>
         <p:nvSpPr>
-          <p:cNvPr id="760835" name="Rectangle 3"/>
+          <p:cNvPr id="756739" name="Rectangle 3"/>
           <p:cNvSpPr>
             <a:spLocks noGrp="1" noChangeArrowheads="1"/>
           </p:cNvSpPr>
@@ -2331,7 +2331,7 @@
           <a:bodyPr/>
           <a:lstStyle/>
           <a:p>
-            <a:fld id="{6C280F22-40E1-47F9-BBD1-63255FC34830}" type="slidenum">
+            <a:fld id="{90923367-420B-438F-99D4-B4C3CAF0043F}" type="slidenum">
               <a:rPr lang="en-US"/>
               <a:pPr/>
               <a:t>27</a:t>
@@ -2342,7 +2342,7 @@
       </p:sp>
       <p:sp>
         <p:nvSpPr>
-          <p:cNvPr id="756738" name="Rectangle 2"/>
+          <p:cNvPr id="720898" name="Rectangle 2"/>
           <p:cNvSpPr>
             <a:spLocks noGrp="1" noRot="1" noChangeAspect="1" noChangeArrowheads="1" noTextEdit="1"/>
           </p:cNvSpPr>
@@ -2356,7 +2356,7 @@
       </p:sp>
       <p:sp>
         <p:nvSpPr>
-          <p:cNvPr id="756739" name="Rectangle 3"/>
+          <p:cNvPr id="720899" name="Rectangle 3"/>
           <p:cNvSpPr>
             <a:spLocks noGrp="1" noChangeArrowheads="1"/>
           </p:cNvSpPr>
@@ -2415,7 +2415,7 @@
           <a:bodyPr/>
           <a:lstStyle/>
           <a:p>
-            <a:fld id="{90923367-420B-438F-99D4-B4C3CAF0043F}" type="slidenum">
+            <a:fld id="{C351C094-B5DB-4438-ADA9-FFFA6681FCCF}" type="slidenum">
               <a:rPr lang="en-US"/>
               <a:pPr/>
               <a:t>28</a:t>
@@ -2426,7 +2426,7 @@
       </p:sp>
       <p:sp>
         <p:nvSpPr>
-          <p:cNvPr id="720898" name="Rectangle 2"/>
+          <p:cNvPr id="760834" name="Rectangle 2"/>
           <p:cNvSpPr>
             <a:spLocks noGrp="1" noRot="1" noChangeAspect="1" noChangeArrowheads="1" noTextEdit="1"/>
           </p:cNvSpPr>
@@ -2440,7 +2440,7 @@
       </p:sp>
       <p:sp>
         <p:nvSpPr>
-          <p:cNvPr id="720899" name="Rectangle 3"/>
+          <p:cNvPr id="760835" name="Rectangle 3"/>
           <p:cNvSpPr>
             <a:spLocks noGrp="1" noChangeArrowheads="1"/>
           </p:cNvSpPr>
@@ -5260,11 +5260,7 @@
           <a:p>
             <a:r>
               <a:rPr lang="en-US" dirty="0" smtClean="0"/>
-              <a:t>6F</a:t>
-            </a:r>
-            <a:r>
-              <a:rPr lang="en-US" dirty="0" smtClean="0"/>
-              <a:t>.</a:t>
+              <a:t>6F.</a:t>
             </a:r>
             <a:fld id="{CA4C0C47-BA92-4669-BC5C-D64A96AF3D01}" type="slidenum">
               <a:rPr lang="en-US" smtClean="0"/>
@@ -5446,22 +5442,7 @@
                 <a:uFillTx/>
                 <a:latin typeface="Comic Sans MS" pitchFamily="66" charset="0"/>
               </a:rPr>
-              <a:t>Albert R </a:t>
-            </a:r>
-            <a:r>
-              <a:rPr kumimoji="0" lang="en-US" sz="1200" b="0" i="0" u="none" strike="noStrike" kern="1200" cap="none" spc="0" normalizeH="0" baseline="0" noProof="0" dirty="0" smtClean="0">
-                <a:ln>
-                  <a:noFill/>
-                </a:ln>
-                <a:solidFill>
-                  <a:schemeClr val="tx1"/>
-                </a:solidFill>
-                <a:effectLst/>
-                <a:uLnTx/>
-                <a:uFillTx/>
-                <a:latin typeface="Comic Sans MS" pitchFamily="66" charset="0"/>
-              </a:rPr>
-              <a:t>Meyer       March 11. 2011</a:t>
+              <a:t>Albert R Meyer       March 11. 2011</a:t>
             </a:r>
             <a:endParaRPr kumimoji="0" lang="en-US" sz="1200" b="0" i="0" u="none" strike="noStrike" kern="1200" cap="none" spc="0" normalizeH="0" baseline="0" noProof="0" dirty="0">
               <a:ln>
@@ -12039,7 +12020,6 @@
               <a:rPr lang="en-US" sz="4000" dirty="0" smtClean="0"/>
               <a:t>--called “incomparable”</a:t>
             </a:r>
-            <a:endParaRPr lang="en-US" sz="4000" dirty="0" smtClean="0"/>
           </a:p>
           <a:p>
             <a:pPr>
@@ -12212,15 +12192,7 @@
                   <a:srgbClr val="000000"/>
                 </a:solidFill>
               </a:rPr>
-              <a:t> </a:t>
-            </a:r>
-            <a:r>
-              <a:rPr lang="en-US" sz="4000" dirty="0" smtClean="0">
-                <a:solidFill>
-                  <a:srgbClr val="000000"/>
-                </a:solidFill>
-              </a:rPr>
-              <a:t>from</a:t>
+              <a:t> from</a:t>
             </a:r>
             <a:r>
               <a:rPr lang="en-US" sz="4000" dirty="0" smtClean="0">
@@ -17277,9 +17249,6 @@
                 </a:rPr>
                 <a:t>chain</a:t>
               </a:r>
-              <a:endParaRPr lang="en-US" sz="4800" dirty="0" smtClean="0">
-                <a:latin typeface="Comic Sans MS" pitchFamily="66" charset="0"/>
-              </a:endParaRPr>
             </a:p>
           </p:txBody>
         </p:sp>
@@ -20586,930 +20555,6 @@
       </p:grpSpPr>
       <p:sp>
         <p:nvSpPr>
-          <p:cNvPr id="759810" name="Rectangle 2"/>
-          <p:cNvSpPr>
-            <a:spLocks noGrp="1" noChangeArrowheads="1"/>
-          </p:cNvSpPr>
-          <p:nvPr>
-            <p:ph type="title"/>
-          </p:nvPr>
-        </p:nvSpPr>
-        <p:spPr>
-          <a:xfrm>
-            <a:off x="980754" y="325347"/>
-            <a:ext cx="7182492" cy="1184953"/>
-          </a:xfrm>
-        </p:spPr>
-        <p:txBody>
-          <a:bodyPr>
-            <a:normAutofit/>
-          </a:bodyPr>
-          <a:lstStyle/>
-          <a:p>
-            <a:r>
-              <a:rPr lang="en-US" sz="4400" dirty="0"/>
-              <a:t> </a:t>
-            </a:r>
-            <a:r>
-              <a:rPr lang="en-US" sz="4400" dirty="0" smtClean="0"/>
-              <a:t>parallel </a:t>
-            </a:r>
-            <a:r>
-              <a:rPr lang="en-US" sz="4400" dirty="0"/>
-              <a:t>p</a:t>
-            </a:r>
-            <a:r>
-              <a:rPr lang="en-US" sz="4400" dirty="0" smtClean="0"/>
-              <a:t>rocessing </a:t>
-            </a:r>
-            <a:r>
-              <a:rPr lang="en-US" sz="4400" dirty="0"/>
-              <a:t>t</a:t>
-            </a:r>
-            <a:r>
-              <a:rPr lang="en-US" sz="4400" dirty="0" smtClean="0"/>
-              <a:t>ime</a:t>
-            </a:r>
-            <a:endParaRPr lang="en-US" sz="4400" dirty="0"/>
-          </a:p>
-        </p:txBody>
-      </p:sp>
-      <p:sp>
-        <p:nvSpPr>
-          <p:cNvPr id="759811" name="Rectangle 3"/>
-          <p:cNvSpPr>
-            <a:spLocks noGrp="1" noChangeArrowheads="1"/>
-          </p:cNvSpPr>
-          <p:nvPr>
-            <p:ph type="body" sz="half" idx="1"/>
-          </p:nvPr>
-        </p:nvSpPr>
-        <p:spPr>
-          <a:xfrm>
-            <a:off x="152400" y="2187528"/>
-            <a:ext cx="8839200" cy="4610100"/>
-          </a:xfrm>
-        </p:spPr>
-        <p:txBody>
-          <a:bodyPr>
-            <a:normAutofit/>
-          </a:bodyPr>
-          <a:lstStyle/>
-          <a:p>
-            <a:pPr>
-              <a:buFontTx/>
-              <a:buNone/>
-            </a:pPr>
-            <a:r>
-              <a:rPr lang="en-US" sz="4000" dirty="0" smtClean="0">
-                <a:solidFill>
-                  <a:srgbClr val="0033CC"/>
-                </a:solidFill>
-              </a:rPr>
-              <a:t>  </a:t>
-            </a:r>
-            <a:r>
-              <a:rPr lang="en-US" sz="4000" dirty="0" smtClean="0">
-                <a:solidFill>
-                  <a:srgbClr val="1E03BD"/>
-                </a:solidFill>
-              </a:rPr>
-              <a:t>min</a:t>
-            </a:r>
-            <a:r>
-              <a:rPr lang="en-US" sz="4000" dirty="0" smtClean="0">
-                <a:solidFill>
-                  <a:srgbClr val="0033CC"/>
-                </a:solidFill>
-              </a:rPr>
-              <a:t> </a:t>
-            </a:r>
-            <a:r>
-              <a:rPr lang="en-US" sz="4000" dirty="0">
-                <a:solidFill>
-                  <a:srgbClr val="05811A"/>
-                </a:solidFill>
-              </a:rPr>
-              <a:t>parallel </a:t>
-            </a:r>
-            <a:r>
-              <a:rPr lang="en-US" sz="4000" dirty="0" smtClean="0">
-                <a:solidFill>
-                  <a:srgbClr val="05811A"/>
-                </a:solidFill>
-              </a:rPr>
-              <a:t>time</a:t>
-            </a:r>
-            <a:endParaRPr lang="en-US" sz="4000" dirty="0">
-              <a:solidFill>
-                <a:srgbClr val="05811A"/>
-              </a:solidFill>
-            </a:endParaRPr>
-          </a:p>
-          <a:p>
-            <a:pPr>
-              <a:lnSpc>
-                <a:spcPct val="150000"/>
-              </a:lnSpc>
-              <a:buFontTx/>
-              <a:buNone/>
-            </a:pPr>
-            <a:r>
-              <a:rPr lang="en-US" sz="4400" dirty="0">
-                <a:solidFill>
-                  <a:srgbClr val="0033CC"/>
-                </a:solidFill>
-              </a:rPr>
-              <a:t>  </a:t>
-            </a:r>
-            <a:r>
-              <a:rPr lang="en-US" sz="4400" dirty="0" smtClean="0"/>
-              <a:t>max term load:</a:t>
-            </a:r>
-          </a:p>
-          <a:p>
-            <a:pPr>
-              <a:buFontTx/>
-              <a:buNone/>
-            </a:pPr>
-            <a:r>
-              <a:rPr lang="en-US" sz="4400" dirty="0" smtClean="0">
-                <a:solidFill>
-                  <a:srgbClr val="008000"/>
-                </a:solidFill>
-              </a:rPr>
-              <a:t># processors </a:t>
-            </a:r>
-            <a:r>
-              <a:rPr lang="en-US" sz="4400" dirty="0" smtClean="0"/>
-              <a:t>for min time</a:t>
-            </a:r>
-            <a:endParaRPr lang="en-US" sz="4400" dirty="0"/>
-          </a:p>
-          <a:p>
-            <a:pPr>
-              <a:buFontTx/>
-              <a:buNone/>
-            </a:pPr>
-            <a:r>
-              <a:rPr lang="en-US" sz="4400" dirty="0"/>
-              <a:t>    </a:t>
-            </a:r>
-            <a:r>
-              <a:rPr lang="en-US" sz="4400" dirty="0" smtClean="0">
-                <a:solidFill>
-                  <a:srgbClr val="008000"/>
-                </a:solidFill>
-                <a:latin typeface="Symbol" pitchFamily="18" charset="2"/>
-                <a:sym typeface="Symbol" pitchFamily="18" charset="2"/>
-              </a:rPr>
-              <a:t>             </a:t>
-            </a:r>
-            <a:r>
-              <a:rPr lang="en-US" sz="4400" b="1" dirty="0" smtClean="0">
-                <a:latin typeface="Symbol" pitchFamily="18" charset="2"/>
-                <a:sym typeface="Math1"/>
-              </a:rPr>
-              <a:t>≤</a:t>
-            </a:r>
-            <a:r>
-              <a:rPr lang="en-US" sz="4400" dirty="0" smtClean="0">
-                <a:solidFill>
-                  <a:srgbClr val="008000"/>
-                </a:solidFill>
-              </a:rPr>
-              <a:t> max </a:t>
-            </a:r>
-            <a:r>
-              <a:rPr lang="en-US" sz="4400" dirty="0" err="1" smtClean="0">
-                <a:solidFill>
-                  <a:srgbClr val="008000"/>
-                </a:solidFill>
-              </a:rPr>
-              <a:t>antichain</a:t>
-            </a:r>
-            <a:r>
-              <a:rPr lang="en-US" sz="4400" dirty="0" smtClean="0">
-                <a:solidFill>
-                  <a:srgbClr val="008000"/>
-                </a:solidFill>
-              </a:rPr>
-              <a:t> size</a:t>
-            </a:r>
-            <a:endParaRPr lang="en-US" sz="4400" dirty="0">
-              <a:solidFill>
-                <a:srgbClr val="008000"/>
-              </a:solidFill>
-            </a:endParaRPr>
-          </a:p>
-        </p:txBody>
-      </p:sp>
-      <p:grpSp>
-        <p:nvGrpSpPr>
-          <p:cNvPr id="12" name="Group 11"/>
-          <p:cNvGrpSpPr/>
-          <p:nvPr/>
-        </p:nvGrpSpPr>
-        <p:grpSpPr>
-          <a:xfrm>
-            <a:off x="3225421" y="5314824"/>
-            <a:ext cx="4748981" cy="1100570"/>
-            <a:chOff x="2424049" y="4534000"/>
-            <a:chExt cx="4748981" cy="1100570"/>
-          </a:xfrm>
-        </p:grpSpPr>
-        <p:sp>
-          <p:nvSpPr>
-            <p:cNvPr id="6" name="Right Brace 5"/>
-            <p:cNvSpPr/>
-            <p:nvPr/>
-          </p:nvSpPr>
-          <p:spPr>
-            <a:xfrm rot="5400000">
-              <a:off x="4537985" y="2420064"/>
-              <a:ext cx="521110" cy="4748981"/>
-            </a:xfrm>
-            <a:prstGeom prst="rightBrace">
-              <a:avLst/>
-            </a:prstGeom>
-            <a:ln w="25400">
-              <a:solidFill>
-                <a:schemeClr val="tx1"/>
-              </a:solidFill>
-              <a:prstDash val="sysDash"/>
-            </a:ln>
-          </p:spPr>
-          <p:style>
-            <a:lnRef idx="1">
-              <a:schemeClr val="accent1"/>
-            </a:lnRef>
-            <a:fillRef idx="0">
-              <a:schemeClr val="accent1"/>
-            </a:fillRef>
-            <a:effectRef idx="0">
-              <a:schemeClr val="accent1"/>
-            </a:effectRef>
-            <a:fontRef idx="minor">
-              <a:schemeClr val="tx1"/>
-            </a:fontRef>
-          </p:style>
-          <p:txBody>
-            <a:bodyPr rtlCol="0" anchor="ctr"/>
-            <a:lstStyle/>
-            <a:p>
-              <a:pPr algn="ctr"/>
-              <a:endParaRPr lang="en-US"/>
-            </a:p>
-          </p:txBody>
-        </p:sp>
-        <p:sp>
-          <p:nvSpPr>
-            <p:cNvPr id="11" name="TextBox 10"/>
-            <p:cNvSpPr txBox="1"/>
-            <p:nvPr/>
-          </p:nvSpPr>
-          <p:spPr>
-            <a:xfrm>
-              <a:off x="3401297" y="5049795"/>
-              <a:ext cx="3087329" cy="584775"/>
-            </a:xfrm>
-            <a:prstGeom prst="rect">
-              <a:avLst/>
-            </a:prstGeom>
-            <a:noFill/>
-          </p:spPr>
-          <p:txBody>
-            <a:bodyPr wrap="square" rtlCol="0">
-              <a:spAutoFit/>
-            </a:bodyPr>
-            <a:lstStyle/>
-            <a:p>
-              <a:r>
-                <a:rPr lang="en-US" sz="3200" dirty="0" smtClean="0">
-                  <a:latin typeface="Comic Sans MS" pitchFamily="66" charset="0"/>
-                </a:rPr>
-                <a:t>5 in this case</a:t>
-              </a:r>
-              <a:endParaRPr lang="en-US" sz="3200" dirty="0">
-                <a:latin typeface="Comic Sans MS" pitchFamily="66" charset="0"/>
-              </a:endParaRPr>
-            </a:p>
-          </p:txBody>
-        </p:sp>
-      </p:grpSp>
-      <p:sp>
-        <p:nvSpPr>
-          <p:cNvPr id="16" name="Rectangle 15"/>
-          <p:cNvSpPr/>
-          <p:nvPr/>
-        </p:nvSpPr>
-        <p:spPr>
-          <a:xfrm>
-            <a:off x="328773" y="2167836"/>
-            <a:ext cx="8507002" cy="873303"/>
-          </a:xfrm>
-          <a:prstGeom prst="rect">
-            <a:avLst/>
-          </a:prstGeom>
-          <a:noFill/>
-          <a:ln w="31750">
-            <a:solidFill>
-              <a:srgbClr val="FF00FF"/>
-            </a:solidFill>
-            <a:prstDash val="sysDash"/>
-          </a:ln>
-        </p:spPr>
-        <p:style>
-          <a:lnRef idx="2">
-            <a:schemeClr val="accent1">
-              <a:shade val="50000"/>
-            </a:schemeClr>
-          </a:lnRef>
-          <a:fillRef idx="1">
-            <a:schemeClr val="accent1"/>
-          </a:fillRef>
-          <a:effectRef idx="0">
-            <a:schemeClr val="accent1"/>
-          </a:effectRef>
-          <a:fontRef idx="minor">
-            <a:schemeClr val="lt1"/>
-          </a:fontRef>
-        </p:style>
-        <p:txBody>
-          <a:bodyPr rtlCol="0" anchor="ctr"/>
-          <a:lstStyle/>
-          <a:p>
-            <a:pPr algn="ctr"/>
-            <a:endParaRPr lang="en-US"/>
-          </a:p>
-        </p:txBody>
-      </p:sp>
-      <p:sp>
-        <p:nvSpPr>
-          <p:cNvPr id="17" name="Rectangle 16"/>
-          <p:cNvSpPr/>
-          <p:nvPr/>
-        </p:nvSpPr>
-        <p:spPr>
-          <a:xfrm>
-            <a:off x="164387" y="4068550"/>
-            <a:ext cx="8435083" cy="1623317"/>
-          </a:xfrm>
-          <a:prstGeom prst="rect">
-            <a:avLst/>
-          </a:prstGeom>
-          <a:noFill/>
-          <a:ln w="31750">
-            <a:solidFill>
-              <a:srgbClr val="FF00FF"/>
-            </a:solidFill>
-            <a:prstDash val="sysDash"/>
-          </a:ln>
-        </p:spPr>
-        <p:style>
-          <a:lnRef idx="2">
-            <a:schemeClr val="accent1">
-              <a:shade val="50000"/>
-            </a:schemeClr>
-          </a:lnRef>
-          <a:fillRef idx="1">
-            <a:schemeClr val="accent1"/>
-          </a:fillRef>
-          <a:effectRef idx="0">
-            <a:schemeClr val="accent1"/>
-          </a:effectRef>
-          <a:fontRef idx="minor">
-            <a:schemeClr val="lt1"/>
-          </a:fontRef>
-        </p:style>
-        <p:txBody>
-          <a:bodyPr rtlCol="0" anchor="ctr"/>
-          <a:lstStyle/>
-          <a:p>
-            <a:pPr algn="ctr"/>
-            <a:endParaRPr lang="en-US"/>
-          </a:p>
-        </p:txBody>
-      </p:sp>
-      <p:sp>
-        <p:nvSpPr>
-          <p:cNvPr id="18" name="TextBox 17"/>
-          <p:cNvSpPr txBox="1"/>
-          <p:nvPr/>
-        </p:nvSpPr>
-        <p:spPr>
-          <a:xfrm>
-            <a:off x="318502" y="1407565"/>
-            <a:ext cx="6264857" cy="707886"/>
-          </a:xfrm>
-          <a:prstGeom prst="rect">
-            <a:avLst/>
-          </a:prstGeom>
-          <a:noFill/>
-        </p:spPr>
-        <p:txBody>
-          <a:bodyPr wrap="none" rtlCol="0">
-            <a:spAutoFit/>
-          </a:bodyPr>
-          <a:lstStyle/>
-          <a:p>
-            <a:r>
-              <a:rPr lang="en-US" sz="4000" dirty="0" smtClean="0">
-                <a:latin typeface="Comic Sans MS" pitchFamily="66" charset="0"/>
-              </a:rPr>
-              <a:t>min # terms to graduate:</a:t>
-            </a:r>
-            <a:endParaRPr lang="en-US" sz="4000" dirty="0">
-              <a:latin typeface="Comic Sans MS" pitchFamily="66" charset="0"/>
-            </a:endParaRPr>
-          </a:p>
-        </p:txBody>
-      </p:sp>
-      <p:sp>
-        <p:nvSpPr>
-          <p:cNvPr id="19" name="TextBox 18"/>
-          <p:cNvSpPr txBox="1"/>
-          <p:nvPr/>
-        </p:nvSpPr>
-        <p:spPr>
-          <a:xfrm>
-            <a:off x="4572000" y="2219218"/>
-            <a:ext cx="4059125" cy="707886"/>
-          </a:xfrm>
-          <a:prstGeom prst="rect">
-            <a:avLst/>
-          </a:prstGeom>
-          <a:noFill/>
-        </p:spPr>
-        <p:txBody>
-          <a:bodyPr wrap="none" rtlCol="0">
-            <a:spAutoFit/>
-          </a:bodyPr>
-          <a:lstStyle/>
-          <a:p>
-            <a:r>
-              <a:rPr lang="en-US" sz="4000" dirty="0" smtClean="0">
-                <a:latin typeface="Comic Sans MS" pitchFamily="66" charset="0"/>
-              </a:rPr>
-              <a:t>= </a:t>
-            </a:r>
-            <a:r>
-              <a:rPr lang="en-US" sz="4000" dirty="0" smtClean="0">
-                <a:solidFill>
-                  <a:srgbClr val="0033CC"/>
-                </a:solidFill>
-                <a:latin typeface="Comic Sans MS" pitchFamily="66" charset="0"/>
-              </a:rPr>
-              <a:t>max </a:t>
-            </a:r>
-            <a:r>
-              <a:rPr lang="en-US" sz="4000" dirty="0" smtClean="0">
-                <a:solidFill>
-                  <a:srgbClr val="05811A"/>
-                </a:solidFill>
-                <a:latin typeface="Comic Sans MS" pitchFamily="66" charset="0"/>
-              </a:rPr>
-              <a:t>chain size</a:t>
-            </a:r>
-            <a:endParaRPr lang="en-US" dirty="0">
-              <a:solidFill>
-                <a:srgbClr val="05811A"/>
-              </a:solidFill>
-            </a:endParaRPr>
-          </a:p>
-        </p:txBody>
-      </p:sp>
-      <p:sp>
-        <p:nvSpPr>
-          <p:cNvPr id="21" name="Slide Number Placeholder 5"/>
-          <p:cNvSpPr>
-            <a:spLocks noGrp="1"/>
-          </p:cNvSpPr>
-          <p:nvPr>
-            <p:ph type="sldNum" sz="quarter" idx="4"/>
-          </p:nvPr>
-        </p:nvSpPr>
-        <p:spPr>
-          <a:xfrm>
-            <a:off x="8237750" y="6596742"/>
-            <a:ext cx="906250" cy="261257"/>
-          </a:xfrm>
-          <a:prstGeom prst="rect">
-            <a:avLst/>
-          </a:prstGeom>
-        </p:spPr>
-        <p:txBody>
-          <a:bodyPr/>
-          <a:lstStyle>
-            <a:lvl1pPr>
-              <a:defRPr sz="1200">
-                <a:latin typeface="Comic Sans MS" pitchFamily="66" charset="0"/>
-              </a:defRPr>
-            </a:lvl1pPr>
-          </a:lstStyle>
-          <a:p>
-            <a:r>
-              <a:rPr lang="en-US" dirty="0" smtClean="0"/>
-              <a:t>6F.</a:t>
-            </a:r>
-            <a:fld id="{CA4C0C47-BA92-4669-BC5C-D64A96AF3D01}" type="slidenum">
-              <a:rPr lang="en-US" smtClean="0"/>
-              <a:pPr/>
-              <a:t>25</a:t>
-            </a:fld>
-            <a:endParaRPr lang="en-US" dirty="0"/>
-          </a:p>
-        </p:txBody>
-      </p:sp>
-    </p:spTree>
-  </p:cSld>
-  <p:clrMapOvr>
-    <a:masterClrMapping/>
-  </p:clrMapOvr>
-  <p:transition/>
-  <p:timing>
-    <p:tnLst>
-      <p:par>
-        <p:cTn id="1" dur="indefinite" restart="never" nodeType="tmRoot">
-          <p:childTnLst>
-            <p:seq concurrent="1" nextAc="seek">
-              <p:cTn id="2" dur="indefinite" nodeType="mainSeq">
-                <p:childTnLst>
-                  <p:par>
-                    <p:cTn id="3" fill="hold">
-                      <p:stCondLst>
-                        <p:cond delay="indefinite"/>
-                      </p:stCondLst>
-                      <p:childTnLst>
-                        <p:par>
-                          <p:cTn id="4" fill="hold">
-                            <p:stCondLst>
-                              <p:cond delay="0"/>
-                            </p:stCondLst>
-                            <p:childTnLst>
-                              <p:par>
-                                <p:cTn id="5" presetID="1" presetClass="entr" presetSubtype="0" fill="hold" grpId="0" nodeType="clickEffect">
-                                  <p:stCondLst>
-                                    <p:cond delay="0"/>
-                                  </p:stCondLst>
-                                  <p:childTnLst>
-                                    <p:set>
-                                      <p:cBhvr>
-                                        <p:cTn id="6" dur="1" fill="hold">
-                                          <p:stCondLst>
-                                            <p:cond delay="0"/>
-                                          </p:stCondLst>
-                                        </p:cTn>
-                                        <p:tgtEl>
-                                          <p:spTgt spid="19"/>
-                                        </p:tgtEl>
-                                        <p:attrNameLst>
-                                          <p:attrName>style.visibility</p:attrName>
-                                        </p:attrNameLst>
-                                      </p:cBhvr>
-                                      <p:to>
-                                        <p:strVal val="visible"/>
-                                      </p:to>
-                                    </p:set>
-                                  </p:childTnLst>
-                                </p:cTn>
-                              </p:par>
-                            </p:childTnLst>
-                          </p:cTn>
-                        </p:par>
-                        <p:par>
-                          <p:cTn id="7" fill="hold">
-                            <p:stCondLst>
-                              <p:cond delay="0"/>
-                            </p:stCondLst>
-                            <p:childTnLst>
-                              <p:par>
-                                <p:cTn id="8" presetID="9" presetClass="entr" presetSubtype="0" fill="hold" grpId="0" nodeType="afterEffect">
-                                  <p:stCondLst>
-                                    <p:cond delay="0"/>
-                                  </p:stCondLst>
-                                  <p:childTnLst>
-                                    <p:set>
-                                      <p:cBhvr>
-                                        <p:cTn id="9" dur="1" fill="hold">
-                                          <p:stCondLst>
-                                            <p:cond delay="0"/>
-                                          </p:stCondLst>
-                                        </p:cTn>
-                                        <p:tgtEl>
-                                          <p:spTgt spid="16"/>
-                                        </p:tgtEl>
-                                        <p:attrNameLst>
-                                          <p:attrName>style.visibility</p:attrName>
-                                        </p:attrNameLst>
-                                      </p:cBhvr>
-                                      <p:to>
-                                        <p:strVal val="visible"/>
-                                      </p:to>
-                                    </p:set>
-                                    <p:animEffect transition="in" filter="dissolve">
-                                      <p:cBhvr>
-                                        <p:cTn id="10" dur="500"/>
-                                        <p:tgtEl>
-                                          <p:spTgt spid="16"/>
-                                        </p:tgtEl>
-                                      </p:cBhvr>
-                                    </p:animEffect>
-                                  </p:childTnLst>
-                                </p:cTn>
-                              </p:par>
-                            </p:childTnLst>
-                          </p:cTn>
-                        </p:par>
-                      </p:childTnLst>
-                    </p:cTn>
-                  </p:par>
-                  <p:par>
-                    <p:cTn id="11" fill="hold">
-                      <p:stCondLst>
-                        <p:cond delay="indefinite"/>
-                      </p:stCondLst>
-                      <p:childTnLst>
-                        <p:par>
-                          <p:cTn id="12" fill="hold">
-                            <p:stCondLst>
-                              <p:cond delay="0"/>
-                            </p:stCondLst>
-                            <p:childTnLst>
-                              <p:par>
-                                <p:cTn id="13" presetID="1" presetClass="entr" presetSubtype="0" fill="hold" grpId="0" nodeType="clickEffect">
-                                  <p:stCondLst>
-                                    <p:cond delay="0"/>
-                                  </p:stCondLst>
-                                  <p:childTnLst>
-                                    <p:set>
-                                      <p:cBhvr>
-                                        <p:cTn id="14" dur="1" fill="hold">
-                                          <p:stCondLst>
-                                            <p:cond delay="0"/>
-                                          </p:stCondLst>
-                                        </p:cTn>
-                                        <p:tgtEl>
-                                          <p:spTgt spid="759811">
-                                            <p:txEl>
-                                              <p:pRg st="1" end="1"/>
-                                            </p:txEl>
-                                          </p:spTgt>
-                                        </p:tgtEl>
-                                        <p:attrNameLst>
-                                          <p:attrName>style.visibility</p:attrName>
-                                        </p:attrNameLst>
-                                      </p:cBhvr>
-                                      <p:to>
-                                        <p:strVal val="visible"/>
-                                      </p:to>
-                                    </p:set>
-                                  </p:childTnLst>
-                                </p:cTn>
-                              </p:par>
-                            </p:childTnLst>
-                          </p:cTn>
-                        </p:par>
-                      </p:childTnLst>
-                    </p:cTn>
-                  </p:par>
-                  <p:par>
-                    <p:cTn id="15" fill="hold">
-                      <p:stCondLst>
-                        <p:cond delay="indefinite"/>
-                      </p:stCondLst>
-                      <p:childTnLst>
-                        <p:par>
-                          <p:cTn id="16" fill="hold">
-                            <p:stCondLst>
-                              <p:cond delay="0"/>
-                            </p:stCondLst>
-                            <p:childTnLst>
-                              <p:par>
-                                <p:cTn id="17" presetID="1" presetClass="entr" presetSubtype="0" fill="hold" grpId="0" nodeType="clickEffect">
-                                  <p:stCondLst>
-                                    <p:cond delay="0"/>
-                                  </p:stCondLst>
-                                  <p:childTnLst>
-                                    <p:set>
-                                      <p:cBhvr>
-                                        <p:cTn id="18" dur="1" fill="hold">
-                                          <p:stCondLst>
-                                            <p:cond delay="0"/>
-                                          </p:stCondLst>
-                                        </p:cTn>
-                                        <p:tgtEl>
-                                          <p:spTgt spid="759811">
-                                            <p:txEl>
-                                              <p:pRg st="2" end="2"/>
-                                            </p:txEl>
-                                          </p:spTgt>
-                                        </p:tgtEl>
-                                        <p:attrNameLst>
-                                          <p:attrName>style.visibility</p:attrName>
-                                        </p:attrNameLst>
-                                      </p:cBhvr>
-                                      <p:to>
-                                        <p:strVal val="visible"/>
-                                      </p:to>
-                                    </p:set>
-                                  </p:childTnLst>
-                                </p:cTn>
-                              </p:par>
-                            </p:childTnLst>
-                          </p:cTn>
-                        </p:par>
-                      </p:childTnLst>
-                    </p:cTn>
-                  </p:par>
-                  <p:par>
-                    <p:cTn id="19" fill="hold">
-                      <p:stCondLst>
-                        <p:cond delay="indefinite"/>
-                      </p:stCondLst>
-                      <p:childTnLst>
-                        <p:par>
-                          <p:cTn id="20" fill="hold">
-                            <p:stCondLst>
-                              <p:cond delay="0"/>
-                            </p:stCondLst>
-                            <p:childTnLst>
-                              <p:par>
-                                <p:cTn id="21" presetID="1" presetClass="entr" presetSubtype="0" fill="hold" grpId="0" nodeType="clickEffect">
-                                  <p:stCondLst>
-                                    <p:cond delay="0"/>
-                                  </p:stCondLst>
-                                  <p:childTnLst>
-                                    <p:set>
-                                      <p:cBhvr>
-                                        <p:cTn id="22" dur="1" fill="hold">
-                                          <p:stCondLst>
-                                            <p:cond delay="0"/>
-                                          </p:stCondLst>
-                                        </p:cTn>
-                                        <p:tgtEl>
-                                          <p:spTgt spid="759811">
-                                            <p:txEl>
-                                              <p:pRg st="3" end="3"/>
-                                            </p:txEl>
-                                          </p:spTgt>
-                                        </p:tgtEl>
-                                        <p:attrNameLst>
-                                          <p:attrName>style.visibility</p:attrName>
-                                        </p:attrNameLst>
-                                      </p:cBhvr>
-                                      <p:to>
-                                        <p:strVal val="visible"/>
-                                      </p:to>
-                                    </p:set>
-                                  </p:childTnLst>
-                                </p:cTn>
-                              </p:par>
-                            </p:childTnLst>
-                          </p:cTn>
-                        </p:par>
-                        <p:par>
-                          <p:cTn id="23" fill="hold">
-                            <p:stCondLst>
-                              <p:cond delay="0"/>
-                            </p:stCondLst>
-                            <p:childTnLst>
-                              <p:par>
-                                <p:cTn id="24" presetID="9" presetClass="entr" presetSubtype="0" fill="hold" grpId="0" nodeType="afterEffect">
-                                  <p:stCondLst>
-                                    <p:cond delay="0"/>
-                                  </p:stCondLst>
-                                  <p:childTnLst>
-                                    <p:set>
-                                      <p:cBhvr>
-                                        <p:cTn id="25" dur="1" fill="hold">
-                                          <p:stCondLst>
-                                            <p:cond delay="0"/>
-                                          </p:stCondLst>
-                                        </p:cTn>
-                                        <p:tgtEl>
-                                          <p:spTgt spid="17"/>
-                                        </p:tgtEl>
-                                        <p:attrNameLst>
-                                          <p:attrName>style.visibility</p:attrName>
-                                        </p:attrNameLst>
-                                      </p:cBhvr>
-                                      <p:to>
-                                        <p:strVal val="visible"/>
-                                      </p:to>
-                                    </p:set>
-                                    <p:animEffect transition="in" filter="dissolve">
-                                      <p:cBhvr>
-                                        <p:cTn id="26" dur="1000"/>
-                                        <p:tgtEl>
-                                          <p:spTgt spid="17"/>
-                                        </p:tgtEl>
-                                      </p:cBhvr>
-                                    </p:animEffect>
-                                  </p:childTnLst>
-                                </p:cTn>
-                              </p:par>
-                            </p:childTnLst>
-                          </p:cTn>
-                        </p:par>
-                      </p:childTnLst>
-                    </p:cTn>
-                  </p:par>
-                  <p:par>
-                    <p:cTn id="27" fill="hold">
-                      <p:stCondLst>
-                        <p:cond delay="indefinite"/>
-                      </p:stCondLst>
-                      <p:childTnLst>
-                        <p:par>
-                          <p:cTn id="28" fill="hold">
-                            <p:stCondLst>
-                              <p:cond delay="0"/>
-                            </p:stCondLst>
-                            <p:childTnLst>
-                              <p:par>
-                                <p:cTn id="29" presetID="1" presetClass="entr" presetSubtype="0" fill="hold" nodeType="clickEffect">
-                                  <p:stCondLst>
-                                    <p:cond delay="0"/>
-                                  </p:stCondLst>
-                                  <p:childTnLst>
-                                    <p:set>
-                                      <p:cBhvr>
-                                        <p:cTn id="30" dur="1" fill="hold">
-                                          <p:stCondLst>
-                                            <p:cond delay="0"/>
-                                          </p:stCondLst>
-                                        </p:cTn>
-                                        <p:tgtEl>
-                                          <p:spTgt spid="12"/>
-                                        </p:tgtEl>
-                                        <p:attrNameLst>
-                                          <p:attrName>style.visibility</p:attrName>
-                                        </p:attrNameLst>
-                                      </p:cBhvr>
-                                      <p:to>
-                                        <p:strVal val="visible"/>
-                                      </p:to>
-                                    </p:set>
-                                  </p:childTnLst>
-                                </p:cTn>
-                              </p:par>
-                            </p:childTnLst>
-                          </p:cTn>
-                        </p:par>
-                      </p:childTnLst>
-                    </p:cTn>
-                  </p:par>
-                </p:childTnLst>
-              </p:cTn>
-              <p:prevCondLst>
-                <p:cond evt="onPrev" delay="0">
-                  <p:tgtEl>
-                    <p:sldTgt/>
-                  </p:tgtEl>
-                </p:cond>
-              </p:prevCondLst>
-              <p:nextCondLst>
-                <p:cond evt="onNext" delay="0">
-                  <p:tgtEl>
-                    <p:sldTgt/>
-                  </p:tgtEl>
-                </p:cond>
-              </p:nextCondLst>
-            </p:seq>
-          </p:childTnLst>
-        </p:cTn>
-      </p:par>
-    </p:tnLst>
-    <p:bldLst>
-      <p:bldP spid="759811" grpId="0" build="p"/>
-      <p:bldP spid="16" grpId="0" uiExpand="1" animBg="1"/>
-      <p:bldP spid="17" grpId="0" animBg="1"/>
-      <p:bldP spid="19" grpId="0"/>
-    </p:bldLst>
-  </p:timing>
-</p:sld>
-</file>
-
-<file path=ppt/slides/slide26.xml><?xml version="1.0" encoding="utf-8"?>
-<p:sld xmlns:a="http://schemas.openxmlformats.org/drawingml/2006/main" xmlns:r="http://schemas.openxmlformats.org/officeDocument/2006/relationships" xmlns:mc="http://schemas.openxmlformats.org/markup-compatibility/2006" xmlns:mv="urn:schemas-microsoft-com:mac:vml" xmlns:p="http://schemas.openxmlformats.org/presentationml/2006/main" mc:Ignorable="mv" mc:PreserveAttributes="mv:*">
-  <p:cSld>
-    <p:spTree>
-      <p:nvGrpSpPr>
-        <p:cNvPr id="1" name=""/>
-        <p:cNvGrpSpPr/>
-        <p:nvPr/>
-      </p:nvGrpSpPr>
-      <p:grpSpPr>
-        <a:xfrm>
-          <a:off x="0" y="0"/>
-          <a:ext cx="0" cy="0"/>
-          <a:chOff x="0" y="0"/>
-          <a:chExt cx="0" cy="0"/>
-        </a:xfrm>
-      </p:grpSpPr>
-      <p:sp>
-        <p:nvSpPr>
           <p:cNvPr id="755722" name="AutoShape 10"/>
           <p:cNvSpPr>
             <a:spLocks noChangeArrowheads="1"/>
@@ -21732,7 +20777,7 @@
             <a:fld id="{CA4C0C47-BA92-4669-BC5C-D64A96AF3D01}" type="slidenum">
               <a:rPr lang="en-US" smtClean="0"/>
               <a:pPr/>
-              <a:t>26</a:t>
+              <a:t>25</a:t>
             </a:fld>
             <a:endParaRPr lang="en-US" dirty="0"/>
           </a:p>
@@ -23145,7 +22190,7 @@
 </p:sld>
 </file>
 
-<file path=ppt/slides/slide27.xml><?xml version="1.0" encoding="utf-8"?>
+<file path=ppt/slides/slide26.xml><?xml version="1.0" encoding="utf-8"?>
 <p:sld xmlns:a="http://schemas.openxmlformats.org/drawingml/2006/main" xmlns:r="http://schemas.openxmlformats.org/officeDocument/2006/relationships" xmlns:mc="http://schemas.openxmlformats.org/markup-compatibility/2006" xmlns:mv="urn:schemas-microsoft-com:mac:vml" xmlns:p="http://schemas.openxmlformats.org/presentationml/2006/main" mc:Ignorable="mv" mc:PreserveAttributes="mv:*">
   <p:cSld>
     <p:spTree>
@@ -23350,7 +22395,7 @@
             <a:fld id="{CA4C0C47-BA92-4669-BC5C-D64A96AF3D01}" type="slidenum">
               <a:rPr lang="en-US" smtClean="0"/>
               <a:pPr/>
-              <a:t>27</a:t>
+              <a:t>26</a:t>
             </a:fld>
             <a:endParaRPr lang="en-US" dirty="0"/>
           </a:p>
@@ -24731,7 +23776,7 @@
 </p:sld>
 </file>
 
-<file path=ppt/slides/slide28.xml><?xml version="1.0" encoding="utf-8"?>
+<file path=ppt/slides/slide27.xml><?xml version="1.0" encoding="utf-8"?>
 <p:sld xmlns:a="http://schemas.openxmlformats.org/drawingml/2006/main" xmlns:r="http://schemas.openxmlformats.org/officeDocument/2006/relationships" xmlns:mc="http://schemas.openxmlformats.org/markup-compatibility/2006" xmlns:mv="urn:schemas-microsoft-com:mac:vml" xmlns:p="http://schemas.openxmlformats.org/presentationml/2006/main" mc:Ignorable="mv" mc:PreserveAttributes="mv:*">
   <p:cSld>
     <p:spTree>
@@ -25754,7 +24799,7 @@
             <a:fld id="{CA4C0C47-BA92-4669-BC5C-D64A96AF3D01}" type="slidenum">
               <a:rPr lang="en-US" smtClean="0"/>
               <a:pPr/>
-              <a:t>28</a:t>
+              <a:t>27</a:t>
             </a:fld>
             <a:endParaRPr lang="en-US" dirty="0"/>
           </a:p>
@@ -25879,8 +24924,932 @@
 </p:sld>
 </file>
 
+<file path=ppt/slides/slide28.xml><?xml version="1.0" encoding="utf-8"?>
+<p:sld xmlns:a="http://schemas.openxmlformats.org/drawingml/2006/main" xmlns:r="http://schemas.openxmlformats.org/officeDocument/2006/relationships" xmlns:mc="http://schemas.openxmlformats.org/markup-compatibility/2006" xmlns:mv="urn:schemas-microsoft-com:mac:vml" xmlns:p="http://schemas.openxmlformats.org/presentationml/2006/main" mc:Ignorable="mv" mc:PreserveAttributes="mv:*">
+  <p:cSld>
+    <p:spTree>
+      <p:nvGrpSpPr>
+        <p:cNvPr id="1" name=""/>
+        <p:cNvGrpSpPr/>
+        <p:nvPr/>
+      </p:nvGrpSpPr>
+      <p:grpSpPr>
+        <a:xfrm>
+          <a:off x="0" y="0"/>
+          <a:ext cx="0" cy="0"/>
+          <a:chOff x="0" y="0"/>
+          <a:chExt cx="0" cy="0"/>
+        </a:xfrm>
+      </p:grpSpPr>
+      <p:sp>
+        <p:nvSpPr>
+          <p:cNvPr id="759810" name="Rectangle 2"/>
+          <p:cNvSpPr>
+            <a:spLocks noGrp="1" noChangeArrowheads="1"/>
+          </p:cNvSpPr>
+          <p:nvPr>
+            <p:ph type="title"/>
+          </p:nvPr>
+        </p:nvSpPr>
+        <p:spPr>
+          <a:xfrm>
+            <a:off x="980754" y="325347"/>
+            <a:ext cx="7182492" cy="1184953"/>
+          </a:xfrm>
+        </p:spPr>
+        <p:txBody>
+          <a:bodyPr>
+            <a:normAutofit/>
+          </a:bodyPr>
+          <a:lstStyle/>
+          <a:p>
+            <a:r>
+              <a:rPr lang="en-US" sz="4400" dirty="0"/>
+              <a:t> </a:t>
+            </a:r>
+            <a:r>
+              <a:rPr lang="en-US" sz="4400" dirty="0" smtClean="0"/>
+              <a:t>parallel </a:t>
+            </a:r>
+            <a:r>
+              <a:rPr lang="en-US" sz="4400" dirty="0"/>
+              <a:t>p</a:t>
+            </a:r>
+            <a:r>
+              <a:rPr lang="en-US" sz="4400" dirty="0" smtClean="0"/>
+              <a:t>rocessing </a:t>
+            </a:r>
+            <a:r>
+              <a:rPr lang="en-US" sz="4400" dirty="0"/>
+              <a:t>t</a:t>
+            </a:r>
+            <a:r>
+              <a:rPr lang="en-US" sz="4400" dirty="0" smtClean="0"/>
+              <a:t>ime</a:t>
+            </a:r>
+            <a:endParaRPr lang="en-US" sz="4400" dirty="0"/>
+          </a:p>
+        </p:txBody>
+      </p:sp>
+      <p:sp>
+        <p:nvSpPr>
+          <p:cNvPr id="759811" name="Rectangle 3"/>
+          <p:cNvSpPr>
+            <a:spLocks noGrp="1" noChangeArrowheads="1"/>
+          </p:cNvSpPr>
+          <p:nvPr>
+            <p:ph type="body" sz="half" idx="1"/>
+          </p:nvPr>
+        </p:nvSpPr>
+        <p:spPr>
+          <a:xfrm>
+            <a:off x="152400" y="2187528"/>
+            <a:ext cx="8839200" cy="4610100"/>
+          </a:xfrm>
+        </p:spPr>
+        <p:txBody>
+          <a:bodyPr>
+            <a:normAutofit/>
+          </a:bodyPr>
+          <a:lstStyle/>
+          <a:p>
+            <a:pPr>
+              <a:buFontTx/>
+              <a:buNone/>
+            </a:pPr>
+            <a:r>
+              <a:rPr lang="en-US" sz="4000" dirty="0" smtClean="0">
+                <a:solidFill>
+                  <a:srgbClr val="0033CC"/>
+                </a:solidFill>
+              </a:rPr>
+              <a:t>  </a:t>
+            </a:r>
+            <a:r>
+              <a:rPr lang="en-US" sz="4000" dirty="0" smtClean="0">
+                <a:solidFill>
+                  <a:srgbClr val="1E03BD"/>
+                </a:solidFill>
+              </a:rPr>
+              <a:t>min</a:t>
+            </a:r>
+            <a:r>
+              <a:rPr lang="en-US" sz="4000" dirty="0" smtClean="0">
+                <a:solidFill>
+                  <a:srgbClr val="0033CC"/>
+                </a:solidFill>
+              </a:rPr>
+              <a:t> </a:t>
+            </a:r>
+            <a:r>
+              <a:rPr lang="en-US" sz="4000" dirty="0">
+                <a:solidFill>
+                  <a:srgbClr val="05811A"/>
+                </a:solidFill>
+              </a:rPr>
+              <a:t>parallel </a:t>
+            </a:r>
+            <a:r>
+              <a:rPr lang="en-US" sz="4000" dirty="0" smtClean="0">
+                <a:solidFill>
+                  <a:srgbClr val="05811A"/>
+                </a:solidFill>
+              </a:rPr>
+              <a:t>time</a:t>
+            </a:r>
+            <a:endParaRPr lang="en-US" sz="4000" dirty="0">
+              <a:solidFill>
+                <a:srgbClr val="05811A"/>
+              </a:solidFill>
+            </a:endParaRPr>
+          </a:p>
+          <a:p>
+            <a:pPr>
+              <a:lnSpc>
+                <a:spcPct val="150000"/>
+              </a:lnSpc>
+              <a:buFontTx/>
+              <a:buNone/>
+            </a:pPr>
+            <a:r>
+              <a:rPr lang="en-US" sz="4400" dirty="0">
+                <a:solidFill>
+                  <a:srgbClr val="0033CC"/>
+                </a:solidFill>
+              </a:rPr>
+              <a:t>  </a:t>
+            </a:r>
+            <a:r>
+              <a:rPr lang="en-US" sz="4400" dirty="0" smtClean="0"/>
+              <a:t>max term load:</a:t>
+            </a:r>
+          </a:p>
+          <a:p>
+            <a:pPr>
+              <a:buFontTx/>
+              <a:buNone/>
+            </a:pPr>
+            <a:r>
+              <a:rPr lang="en-US" sz="4400" dirty="0" smtClean="0">
+                <a:solidFill>
+                  <a:srgbClr val="008000"/>
+                </a:solidFill>
+              </a:rPr>
+              <a:t># processors </a:t>
+            </a:r>
+            <a:r>
+              <a:rPr lang="en-US" sz="4400" dirty="0" smtClean="0"/>
+              <a:t>for min time</a:t>
+            </a:r>
+            <a:endParaRPr lang="en-US" sz="4400" dirty="0"/>
+          </a:p>
+          <a:p>
+            <a:pPr>
+              <a:buFontTx/>
+              <a:buNone/>
+            </a:pPr>
+            <a:r>
+              <a:rPr lang="en-US" sz="4400" dirty="0"/>
+              <a:t>    </a:t>
+            </a:r>
+            <a:r>
+              <a:rPr lang="en-US" sz="4400" dirty="0" smtClean="0">
+                <a:solidFill>
+                  <a:srgbClr val="008000"/>
+                </a:solidFill>
+                <a:latin typeface="Symbol" pitchFamily="18" charset="2"/>
+                <a:sym typeface="Symbol" pitchFamily="18" charset="2"/>
+              </a:rPr>
+              <a:t>             </a:t>
+            </a:r>
+            <a:r>
+              <a:rPr lang="en-US" sz="4400" b="1" dirty="0" smtClean="0">
+                <a:latin typeface="Symbol" pitchFamily="18" charset="2"/>
+                <a:sym typeface="Math1"/>
+              </a:rPr>
+              <a:t>≤</a:t>
+            </a:r>
+            <a:r>
+              <a:rPr lang="en-US" sz="4400" dirty="0" smtClean="0">
+                <a:solidFill>
+                  <a:srgbClr val="008000"/>
+                </a:solidFill>
+              </a:rPr>
+              <a:t> max </a:t>
+            </a:r>
+            <a:r>
+              <a:rPr lang="en-US" sz="4400" dirty="0" err="1" smtClean="0">
+                <a:solidFill>
+                  <a:srgbClr val="008000"/>
+                </a:solidFill>
+              </a:rPr>
+              <a:t>antichain</a:t>
+            </a:r>
+            <a:r>
+              <a:rPr lang="en-US" sz="4400" dirty="0" smtClean="0">
+                <a:solidFill>
+                  <a:srgbClr val="008000"/>
+                </a:solidFill>
+              </a:rPr>
+              <a:t> size</a:t>
+            </a:r>
+            <a:endParaRPr lang="en-US" sz="4400" dirty="0">
+              <a:solidFill>
+                <a:srgbClr val="008000"/>
+              </a:solidFill>
+            </a:endParaRPr>
+          </a:p>
+        </p:txBody>
+      </p:sp>
+      <p:grpSp>
+        <p:nvGrpSpPr>
+          <p:cNvPr id="12" name="Group 11"/>
+          <p:cNvGrpSpPr/>
+          <p:nvPr/>
+        </p:nvGrpSpPr>
+        <p:grpSpPr>
+          <a:xfrm>
+            <a:off x="3225421" y="5314824"/>
+            <a:ext cx="4748981" cy="1100570"/>
+            <a:chOff x="2424049" y="4534000"/>
+            <a:chExt cx="4748981" cy="1100570"/>
+          </a:xfrm>
+        </p:grpSpPr>
+        <p:sp>
+          <p:nvSpPr>
+            <p:cNvPr id="6" name="Right Brace 5"/>
+            <p:cNvSpPr/>
+            <p:nvPr/>
+          </p:nvSpPr>
+          <p:spPr>
+            <a:xfrm rot="5400000">
+              <a:off x="4537985" y="2420064"/>
+              <a:ext cx="521110" cy="4748981"/>
+            </a:xfrm>
+            <a:prstGeom prst="rightBrace">
+              <a:avLst/>
+            </a:prstGeom>
+            <a:ln w="25400">
+              <a:solidFill>
+                <a:schemeClr val="tx1"/>
+              </a:solidFill>
+              <a:prstDash val="sysDash"/>
+            </a:ln>
+          </p:spPr>
+          <p:style>
+            <a:lnRef idx="1">
+              <a:schemeClr val="accent1"/>
+            </a:lnRef>
+            <a:fillRef idx="0">
+              <a:schemeClr val="accent1"/>
+            </a:fillRef>
+            <a:effectRef idx="0">
+              <a:schemeClr val="accent1"/>
+            </a:effectRef>
+            <a:fontRef idx="minor">
+              <a:schemeClr val="tx1"/>
+            </a:fontRef>
+          </p:style>
+          <p:txBody>
+            <a:bodyPr rtlCol="0" anchor="ctr"/>
+            <a:lstStyle/>
+            <a:p>
+              <a:pPr algn="ctr"/>
+              <a:endParaRPr lang="en-US"/>
+            </a:p>
+          </p:txBody>
+        </p:sp>
+        <p:sp>
+          <p:nvSpPr>
+            <p:cNvPr id="11" name="TextBox 10"/>
+            <p:cNvSpPr txBox="1"/>
+            <p:nvPr/>
+          </p:nvSpPr>
+          <p:spPr>
+            <a:xfrm>
+              <a:off x="3401297" y="5049795"/>
+              <a:ext cx="3087329" cy="584775"/>
+            </a:xfrm>
+            <a:prstGeom prst="rect">
+              <a:avLst/>
+            </a:prstGeom>
+            <a:noFill/>
+          </p:spPr>
+          <p:txBody>
+            <a:bodyPr wrap="square" rtlCol="0">
+              <a:spAutoFit/>
+            </a:bodyPr>
+            <a:lstStyle/>
+            <a:p>
+              <a:r>
+                <a:rPr lang="en-US" sz="3200" dirty="0" smtClean="0">
+                  <a:latin typeface="Comic Sans MS" pitchFamily="66" charset="0"/>
+                </a:rPr>
+                <a:t>5 in this case</a:t>
+              </a:r>
+              <a:endParaRPr lang="en-US" sz="3200" dirty="0">
+                <a:latin typeface="Comic Sans MS" pitchFamily="66" charset="0"/>
+              </a:endParaRPr>
+            </a:p>
+          </p:txBody>
+        </p:sp>
+      </p:grpSp>
+      <p:sp>
+        <p:nvSpPr>
+          <p:cNvPr id="16" name="Rectangle 15"/>
+          <p:cNvSpPr/>
+          <p:nvPr/>
+        </p:nvSpPr>
+        <p:spPr>
+          <a:xfrm>
+            <a:off x="328773" y="2167836"/>
+            <a:ext cx="8507002" cy="873303"/>
+          </a:xfrm>
+          <a:prstGeom prst="rect">
+            <a:avLst/>
+          </a:prstGeom>
+          <a:noFill/>
+          <a:ln w="31750">
+            <a:solidFill>
+              <a:srgbClr val="FF00FF"/>
+            </a:solidFill>
+            <a:prstDash val="sysDash"/>
+          </a:ln>
+        </p:spPr>
+        <p:style>
+          <a:lnRef idx="2">
+            <a:schemeClr val="accent1">
+              <a:shade val="50000"/>
+            </a:schemeClr>
+          </a:lnRef>
+          <a:fillRef idx="1">
+            <a:schemeClr val="accent1"/>
+          </a:fillRef>
+          <a:effectRef idx="0">
+            <a:schemeClr val="accent1"/>
+          </a:effectRef>
+          <a:fontRef idx="minor">
+            <a:schemeClr val="lt1"/>
+          </a:fontRef>
+        </p:style>
+        <p:txBody>
+          <a:bodyPr rtlCol="0" anchor="ctr"/>
+          <a:lstStyle/>
+          <a:p>
+            <a:pPr algn="ctr"/>
+            <a:endParaRPr lang="en-US"/>
+          </a:p>
+        </p:txBody>
+      </p:sp>
+      <p:sp>
+        <p:nvSpPr>
+          <p:cNvPr id="17" name="Rectangle 16"/>
+          <p:cNvSpPr/>
+          <p:nvPr/>
+        </p:nvSpPr>
+        <p:spPr>
+          <a:xfrm>
+            <a:off x="164387" y="4068550"/>
+            <a:ext cx="8435083" cy="1623317"/>
+          </a:xfrm>
+          <a:prstGeom prst="rect">
+            <a:avLst/>
+          </a:prstGeom>
+          <a:noFill/>
+          <a:ln w="31750">
+            <a:solidFill>
+              <a:srgbClr val="FF00FF"/>
+            </a:solidFill>
+            <a:prstDash val="sysDash"/>
+          </a:ln>
+        </p:spPr>
+        <p:style>
+          <a:lnRef idx="2">
+            <a:schemeClr val="accent1">
+              <a:shade val="50000"/>
+            </a:schemeClr>
+          </a:lnRef>
+          <a:fillRef idx="1">
+            <a:schemeClr val="accent1"/>
+          </a:fillRef>
+          <a:effectRef idx="0">
+            <a:schemeClr val="accent1"/>
+          </a:effectRef>
+          <a:fontRef idx="minor">
+            <a:schemeClr val="lt1"/>
+          </a:fontRef>
+        </p:style>
+        <p:txBody>
+          <a:bodyPr rtlCol="0" anchor="ctr"/>
+          <a:lstStyle/>
+          <a:p>
+            <a:pPr algn="ctr"/>
+            <a:endParaRPr lang="en-US"/>
+          </a:p>
+        </p:txBody>
+      </p:sp>
+      <p:sp>
+        <p:nvSpPr>
+          <p:cNvPr id="18" name="TextBox 17"/>
+          <p:cNvSpPr txBox="1"/>
+          <p:nvPr/>
+        </p:nvSpPr>
+        <p:spPr>
+          <a:xfrm>
+            <a:off x="318502" y="1407565"/>
+            <a:ext cx="6264857" cy="707886"/>
+          </a:xfrm>
+          <a:prstGeom prst="rect">
+            <a:avLst/>
+          </a:prstGeom>
+          <a:noFill/>
+        </p:spPr>
+        <p:txBody>
+          <a:bodyPr wrap="none" rtlCol="0">
+            <a:spAutoFit/>
+          </a:bodyPr>
+          <a:lstStyle/>
+          <a:p>
+            <a:r>
+              <a:rPr lang="en-US" sz="4000" dirty="0" smtClean="0">
+                <a:latin typeface="Comic Sans MS" pitchFamily="66" charset="0"/>
+              </a:rPr>
+              <a:t>min # terms to graduate:</a:t>
+            </a:r>
+            <a:endParaRPr lang="en-US" sz="4000" dirty="0">
+              <a:latin typeface="Comic Sans MS" pitchFamily="66" charset="0"/>
+            </a:endParaRPr>
+          </a:p>
+        </p:txBody>
+      </p:sp>
+      <p:sp>
+        <p:nvSpPr>
+          <p:cNvPr id="19" name="TextBox 18"/>
+          <p:cNvSpPr txBox="1"/>
+          <p:nvPr/>
+        </p:nvSpPr>
+        <p:spPr>
+          <a:xfrm>
+            <a:off x="4572000" y="2219218"/>
+            <a:ext cx="4059125" cy="707886"/>
+          </a:xfrm>
+          <a:prstGeom prst="rect">
+            <a:avLst/>
+          </a:prstGeom>
+          <a:noFill/>
+        </p:spPr>
+        <p:txBody>
+          <a:bodyPr wrap="none" rtlCol="0">
+            <a:spAutoFit/>
+          </a:bodyPr>
+          <a:lstStyle/>
+          <a:p>
+            <a:r>
+              <a:rPr lang="en-US" sz="4000" dirty="0" smtClean="0">
+                <a:latin typeface="Comic Sans MS" pitchFamily="66" charset="0"/>
+              </a:rPr>
+              <a:t>= </a:t>
+            </a:r>
+            <a:r>
+              <a:rPr lang="en-US" sz="4000" dirty="0" smtClean="0">
+                <a:solidFill>
+                  <a:srgbClr val="0033CC"/>
+                </a:solidFill>
+                <a:latin typeface="Comic Sans MS" pitchFamily="66" charset="0"/>
+              </a:rPr>
+              <a:t>max </a:t>
+            </a:r>
+            <a:r>
+              <a:rPr lang="en-US" sz="4000" dirty="0" smtClean="0">
+                <a:solidFill>
+                  <a:srgbClr val="05811A"/>
+                </a:solidFill>
+                <a:latin typeface="Comic Sans MS" pitchFamily="66" charset="0"/>
+              </a:rPr>
+              <a:t>chain size</a:t>
+            </a:r>
+            <a:endParaRPr lang="en-US" dirty="0">
+              <a:solidFill>
+                <a:srgbClr val="05811A"/>
+              </a:solidFill>
+            </a:endParaRPr>
+          </a:p>
+        </p:txBody>
+      </p:sp>
+      <p:sp>
+        <p:nvSpPr>
+          <p:cNvPr id="21" name="Slide Number Placeholder 5"/>
+          <p:cNvSpPr>
+            <a:spLocks noGrp="1"/>
+          </p:cNvSpPr>
+          <p:nvPr>
+            <p:ph type="sldNum" sz="quarter" idx="4"/>
+          </p:nvPr>
+        </p:nvSpPr>
+        <p:spPr>
+          <a:xfrm>
+            <a:off x="8237750" y="6596742"/>
+            <a:ext cx="906250" cy="261257"/>
+          </a:xfrm>
+          <a:prstGeom prst="rect">
+            <a:avLst/>
+          </a:prstGeom>
+        </p:spPr>
+        <p:txBody>
+          <a:bodyPr/>
+          <a:lstStyle>
+            <a:lvl1pPr>
+              <a:defRPr sz="1200">
+                <a:latin typeface="Comic Sans MS" pitchFamily="66" charset="0"/>
+              </a:defRPr>
+            </a:lvl1pPr>
+          </a:lstStyle>
+          <a:p>
+            <a:r>
+              <a:rPr lang="en-US" dirty="0" smtClean="0"/>
+              <a:t>6F.</a:t>
+            </a:r>
+            <a:fld id="{CA4C0C47-BA92-4669-BC5C-D64A96AF3D01}" type="slidenum">
+              <a:rPr lang="en-US" smtClean="0"/>
+              <a:pPr/>
+              <a:t>28</a:t>
+            </a:fld>
+            <a:endParaRPr lang="en-US" dirty="0"/>
+          </a:p>
+        </p:txBody>
+      </p:sp>
+    </p:spTree>
+  </p:cSld>
+  <p:clrMapOvr>
+    <a:masterClrMapping/>
+  </p:clrMapOvr>
+  <p:transition/>
+  <p:timing>
+    <p:tnLst>
+      <p:par>
+        <p:cTn id="1" dur="indefinite" restart="never" nodeType="tmRoot">
+          <p:childTnLst>
+            <p:seq concurrent="1" nextAc="seek">
+              <p:cTn id="2" dur="indefinite" nodeType="mainSeq">
+                <p:childTnLst>
+                  <p:par>
+                    <p:cTn id="3" fill="hold">
+                      <p:stCondLst>
+                        <p:cond delay="indefinite"/>
+                      </p:stCondLst>
+                      <p:childTnLst>
+                        <p:par>
+                          <p:cTn id="4" fill="hold">
+                            <p:stCondLst>
+                              <p:cond delay="0"/>
+                            </p:stCondLst>
+                            <p:childTnLst>
+                              <p:par>
+                                <p:cTn id="5" presetID="1" presetClass="entr" presetSubtype="0" fill="hold" grpId="0" nodeType="clickEffect">
+                                  <p:stCondLst>
+                                    <p:cond delay="0"/>
+                                  </p:stCondLst>
+                                  <p:childTnLst>
+                                    <p:set>
+                                      <p:cBhvr>
+                                        <p:cTn id="6" dur="1" fill="hold">
+                                          <p:stCondLst>
+                                            <p:cond delay="0"/>
+                                          </p:stCondLst>
+                                        </p:cTn>
+                                        <p:tgtEl>
+                                          <p:spTgt spid="19"/>
+                                        </p:tgtEl>
+                                        <p:attrNameLst>
+                                          <p:attrName>style.visibility</p:attrName>
+                                        </p:attrNameLst>
+                                      </p:cBhvr>
+                                      <p:to>
+                                        <p:strVal val="visible"/>
+                                      </p:to>
+                                    </p:set>
+                                  </p:childTnLst>
+                                </p:cTn>
+                              </p:par>
+                            </p:childTnLst>
+                          </p:cTn>
+                        </p:par>
+                        <p:par>
+                          <p:cTn id="7" fill="hold">
+                            <p:stCondLst>
+                              <p:cond delay="0"/>
+                            </p:stCondLst>
+                            <p:childTnLst>
+                              <p:par>
+                                <p:cTn id="8" presetID="9" presetClass="entr" presetSubtype="0" fill="hold" grpId="0" nodeType="afterEffect">
+                                  <p:stCondLst>
+                                    <p:cond delay="0"/>
+                                  </p:stCondLst>
+                                  <p:childTnLst>
+                                    <p:set>
+                                      <p:cBhvr>
+                                        <p:cTn id="9" dur="1" fill="hold">
+                                          <p:stCondLst>
+                                            <p:cond delay="0"/>
+                                          </p:stCondLst>
+                                        </p:cTn>
+                                        <p:tgtEl>
+                                          <p:spTgt spid="16"/>
+                                        </p:tgtEl>
+                                        <p:attrNameLst>
+                                          <p:attrName>style.visibility</p:attrName>
+                                        </p:attrNameLst>
+                                      </p:cBhvr>
+                                      <p:to>
+                                        <p:strVal val="visible"/>
+                                      </p:to>
+                                    </p:set>
+                                    <p:animEffect transition="in" filter="dissolve">
+                                      <p:cBhvr>
+                                        <p:cTn id="10" dur="500"/>
+                                        <p:tgtEl>
+                                          <p:spTgt spid="16"/>
+                                        </p:tgtEl>
+                                      </p:cBhvr>
+                                    </p:animEffect>
+                                  </p:childTnLst>
+                                </p:cTn>
+                              </p:par>
+                            </p:childTnLst>
+                          </p:cTn>
+                        </p:par>
+                      </p:childTnLst>
+                    </p:cTn>
+                  </p:par>
+                  <p:par>
+                    <p:cTn id="11" fill="hold">
+                      <p:stCondLst>
+                        <p:cond delay="indefinite"/>
+                      </p:stCondLst>
+                      <p:childTnLst>
+                        <p:par>
+                          <p:cTn id="12" fill="hold">
+                            <p:stCondLst>
+                              <p:cond delay="0"/>
+                            </p:stCondLst>
+                            <p:childTnLst>
+                              <p:par>
+                                <p:cTn id="13" presetID="1" presetClass="entr" presetSubtype="0" fill="hold" grpId="0" nodeType="clickEffect">
+                                  <p:stCondLst>
+                                    <p:cond delay="0"/>
+                                  </p:stCondLst>
+                                  <p:childTnLst>
+                                    <p:set>
+                                      <p:cBhvr>
+                                        <p:cTn id="14" dur="1" fill="hold">
+                                          <p:stCondLst>
+                                            <p:cond delay="0"/>
+                                          </p:stCondLst>
+                                        </p:cTn>
+                                        <p:tgtEl>
+                                          <p:spTgt spid="759811">
+                                            <p:txEl>
+                                              <p:pRg st="1" end="1"/>
+                                            </p:txEl>
+                                          </p:spTgt>
+                                        </p:tgtEl>
+                                        <p:attrNameLst>
+                                          <p:attrName>style.visibility</p:attrName>
+                                        </p:attrNameLst>
+                                      </p:cBhvr>
+                                      <p:to>
+                                        <p:strVal val="visible"/>
+                                      </p:to>
+                                    </p:set>
+                                  </p:childTnLst>
+                                </p:cTn>
+                              </p:par>
+                            </p:childTnLst>
+                          </p:cTn>
+                        </p:par>
+                      </p:childTnLst>
+                    </p:cTn>
+                  </p:par>
+                  <p:par>
+                    <p:cTn id="15" fill="hold">
+                      <p:stCondLst>
+                        <p:cond delay="indefinite"/>
+                      </p:stCondLst>
+                      <p:childTnLst>
+                        <p:par>
+                          <p:cTn id="16" fill="hold">
+                            <p:stCondLst>
+                              <p:cond delay="0"/>
+                            </p:stCondLst>
+                            <p:childTnLst>
+                              <p:par>
+                                <p:cTn id="17" presetID="1" presetClass="entr" presetSubtype="0" fill="hold" grpId="0" nodeType="clickEffect">
+                                  <p:stCondLst>
+                                    <p:cond delay="0"/>
+                                  </p:stCondLst>
+                                  <p:childTnLst>
+                                    <p:set>
+                                      <p:cBhvr>
+                                        <p:cTn id="18" dur="1" fill="hold">
+                                          <p:stCondLst>
+                                            <p:cond delay="0"/>
+                                          </p:stCondLst>
+                                        </p:cTn>
+                                        <p:tgtEl>
+                                          <p:spTgt spid="759811">
+                                            <p:txEl>
+                                              <p:pRg st="2" end="2"/>
+                                            </p:txEl>
+                                          </p:spTgt>
+                                        </p:tgtEl>
+                                        <p:attrNameLst>
+                                          <p:attrName>style.visibility</p:attrName>
+                                        </p:attrNameLst>
+                                      </p:cBhvr>
+                                      <p:to>
+                                        <p:strVal val="visible"/>
+                                      </p:to>
+                                    </p:set>
+                                  </p:childTnLst>
+                                </p:cTn>
+                              </p:par>
+                            </p:childTnLst>
+                          </p:cTn>
+                        </p:par>
+                      </p:childTnLst>
+                    </p:cTn>
+                  </p:par>
+                  <p:par>
+                    <p:cTn id="19" fill="hold">
+                      <p:stCondLst>
+                        <p:cond delay="indefinite"/>
+                      </p:stCondLst>
+                      <p:childTnLst>
+                        <p:par>
+                          <p:cTn id="20" fill="hold">
+                            <p:stCondLst>
+                              <p:cond delay="0"/>
+                            </p:stCondLst>
+                            <p:childTnLst>
+                              <p:par>
+                                <p:cTn id="21" presetID="1" presetClass="entr" presetSubtype="0" fill="hold" grpId="0" nodeType="clickEffect">
+                                  <p:stCondLst>
+                                    <p:cond delay="0"/>
+                                  </p:stCondLst>
+                                  <p:childTnLst>
+                                    <p:set>
+                                      <p:cBhvr>
+                                        <p:cTn id="22" dur="1" fill="hold">
+                                          <p:stCondLst>
+                                            <p:cond delay="0"/>
+                                          </p:stCondLst>
+                                        </p:cTn>
+                                        <p:tgtEl>
+                                          <p:spTgt spid="759811">
+                                            <p:txEl>
+                                              <p:pRg st="3" end="3"/>
+                                            </p:txEl>
+                                          </p:spTgt>
+                                        </p:tgtEl>
+                                        <p:attrNameLst>
+                                          <p:attrName>style.visibility</p:attrName>
+                                        </p:attrNameLst>
+                                      </p:cBhvr>
+                                      <p:to>
+                                        <p:strVal val="visible"/>
+                                      </p:to>
+                                    </p:set>
+                                  </p:childTnLst>
+                                </p:cTn>
+                              </p:par>
+                            </p:childTnLst>
+                          </p:cTn>
+                        </p:par>
+                        <p:par>
+                          <p:cTn id="23" fill="hold">
+                            <p:stCondLst>
+                              <p:cond delay="0"/>
+                            </p:stCondLst>
+                            <p:childTnLst>
+                              <p:par>
+                                <p:cTn id="24" presetID="9" presetClass="entr" presetSubtype="0" fill="hold" grpId="0" nodeType="afterEffect">
+                                  <p:stCondLst>
+                                    <p:cond delay="0"/>
+                                  </p:stCondLst>
+                                  <p:childTnLst>
+                                    <p:set>
+                                      <p:cBhvr>
+                                        <p:cTn id="25" dur="1" fill="hold">
+                                          <p:stCondLst>
+                                            <p:cond delay="0"/>
+                                          </p:stCondLst>
+                                        </p:cTn>
+                                        <p:tgtEl>
+                                          <p:spTgt spid="17"/>
+                                        </p:tgtEl>
+                                        <p:attrNameLst>
+                                          <p:attrName>style.visibility</p:attrName>
+                                        </p:attrNameLst>
+                                      </p:cBhvr>
+                                      <p:to>
+                                        <p:strVal val="visible"/>
+                                      </p:to>
+                                    </p:set>
+                                    <p:animEffect transition="in" filter="dissolve">
+                                      <p:cBhvr>
+                                        <p:cTn id="26" dur="1000"/>
+                                        <p:tgtEl>
+                                          <p:spTgt spid="17"/>
+                                        </p:tgtEl>
+                                      </p:cBhvr>
+                                    </p:animEffect>
+                                  </p:childTnLst>
+                                </p:cTn>
+                              </p:par>
+                            </p:childTnLst>
+                          </p:cTn>
+                        </p:par>
+                      </p:childTnLst>
+                    </p:cTn>
+                  </p:par>
+                  <p:par>
+                    <p:cTn id="27" fill="hold">
+                      <p:stCondLst>
+                        <p:cond delay="indefinite"/>
+                      </p:stCondLst>
+                      <p:childTnLst>
+                        <p:par>
+                          <p:cTn id="28" fill="hold">
+                            <p:stCondLst>
+                              <p:cond delay="0"/>
+                            </p:stCondLst>
+                            <p:childTnLst>
+                              <p:par>
+                                <p:cTn id="29" presetID="1" presetClass="entr" presetSubtype="0" fill="hold" nodeType="clickEffect">
+                                  <p:stCondLst>
+                                    <p:cond delay="0"/>
+                                  </p:stCondLst>
+                                  <p:childTnLst>
+                                    <p:set>
+                                      <p:cBhvr>
+                                        <p:cTn id="30" dur="1" fill="hold">
+                                          <p:stCondLst>
+                                            <p:cond delay="0"/>
+                                          </p:stCondLst>
+                                        </p:cTn>
+                                        <p:tgtEl>
+                                          <p:spTgt spid="12"/>
+                                        </p:tgtEl>
+                                        <p:attrNameLst>
+                                          <p:attrName>style.visibility</p:attrName>
+                                        </p:attrNameLst>
+                                      </p:cBhvr>
+                                      <p:to>
+                                        <p:strVal val="visible"/>
+                                      </p:to>
+                                    </p:set>
+                                  </p:childTnLst>
+                                </p:cTn>
+                              </p:par>
+                            </p:childTnLst>
+                          </p:cTn>
+                        </p:par>
+                      </p:childTnLst>
+                    </p:cTn>
+                  </p:par>
+                </p:childTnLst>
+              </p:cTn>
+              <p:prevCondLst>
+                <p:cond evt="onPrev" delay="0">
+                  <p:tgtEl>
+                    <p:sldTgt/>
+                  </p:tgtEl>
+                </p:cond>
+              </p:prevCondLst>
+              <p:nextCondLst>
+                <p:cond evt="onNext" delay="0">
+                  <p:tgtEl>
+                    <p:sldTgt/>
+                  </p:tgtEl>
+                </p:cond>
+              </p:nextCondLst>
+            </p:seq>
+          </p:childTnLst>
+        </p:cTn>
+      </p:par>
+    </p:tnLst>
+    <p:bldLst>
+      <p:bldP spid="759811" grpId="0" build="p"/>
+      <p:bldP spid="16" grpId="0" uiExpand="1" animBg="1"/>
+      <p:bldP spid="17" grpId="0" animBg="1"/>
+      <p:bldP spid="19" grpId="0"/>
+    </p:bldLst>
+  </p:timing>
+</p:sld>
+</file>
+
 <file path=ppt/slides/slide29.xml><?xml version="1.0" encoding="utf-8"?>
-<p:sld xmlns:a="http://schemas.openxmlformats.org/drawingml/2006/main" xmlns:r="http://schemas.openxmlformats.org/officeDocument/2006/relationships" xmlns:mc="http://schemas.openxmlformats.org/markup-compatibility/2006" xmlns:mv="urn:schemas-microsoft-com:mac:vml" xmlns:p="http://schemas.openxmlformats.org/presentationml/2006/main" mc:Ignorable="mv" mc:PreserveAttributes="mv:*" show="0">
+<p:sld xmlns:a="http://schemas.openxmlformats.org/drawingml/2006/main" xmlns:r="http://schemas.openxmlformats.org/officeDocument/2006/relationships" xmlns:mc="http://schemas.openxmlformats.org/markup-compatibility/2006" xmlns:mv="urn:schemas-microsoft-com:mac:vml" xmlns:p="http://schemas.openxmlformats.org/presentationml/2006/main" mc:Ignorable="mv" mc:PreserveAttributes="mv:*">
   <p:cSld>
     <p:spTree>
       <p:nvGrpSpPr>
@@ -28370,7 +28339,7 @@
 </file>
 
 <file path=ppt/slides/slide32.xml><?xml version="1.0" encoding="utf-8"?>
-<p:sld xmlns:a="http://schemas.openxmlformats.org/drawingml/2006/main" xmlns:r="http://schemas.openxmlformats.org/officeDocument/2006/relationships" xmlns:mc="http://schemas.openxmlformats.org/markup-compatibility/2006" xmlns:mv="urn:schemas-microsoft-com:mac:vml" xmlns:p="http://schemas.openxmlformats.org/presentationml/2006/main" mc:Ignorable="mv" mc:PreserveAttributes="mv:*" showMasterPhAnim="0" show="0">
+<p:sld xmlns:a="http://schemas.openxmlformats.org/drawingml/2006/main" xmlns:r="http://schemas.openxmlformats.org/officeDocument/2006/relationships" xmlns:mc="http://schemas.openxmlformats.org/markup-compatibility/2006" xmlns:mv="urn:schemas-microsoft-com:mac:vml" xmlns:p="http://schemas.openxmlformats.org/presentationml/2006/main" mc:Ignorable="mv" mc:PreserveAttributes="mv:*" showMasterPhAnim="0">
   <p:cSld>
     <p:spTree>
       <p:nvGrpSpPr>
@@ -28650,9 +28619,6 @@
                 </a:rPr>
                 <a:t> size</a:t>
               </a:r>
-              <a:endParaRPr lang="en-US" sz="4400" dirty="0" smtClean="0">
-                <a:latin typeface="Comic Sans MS" pitchFamily="66" charset="0"/>
-              </a:endParaRPr>
             </a:p>
           </p:txBody>
         </p:sp>
@@ -28753,13 +28719,6 @@
                   </a:rPr>
                   <a:t>a</a:t>
                 </a:r>
-                <a:endParaRPr lang="en-US" sz="7200" dirty="0" smtClean="0">
-                  <a:solidFill>
-                    <a:srgbClr val="05811A"/>
-                  </a:solidFill>
-                  <a:latin typeface="Comic Sans MS"/>
-                  <a:cs typeface="Comic Sans MS"/>
-                </a:endParaRPr>
               </a:p>
             </p:txBody>
           </p:sp>
@@ -28812,9 +28771,6 @@
               </a:rPr>
               <a:t>vertices</a:t>
             </a:r>
-            <a:endParaRPr lang="en-US" sz="4800" dirty="0" smtClean="0">
-              <a:latin typeface="Comic Sans MS" pitchFamily="66" charset="0"/>
-            </a:endParaRPr>
           </a:p>
         </p:txBody>
       </p:sp>
@@ -29553,7 +29509,7 @@
 </file>
 
 <file path=ppt/slides/slide33.xml><?xml version="1.0" encoding="utf-8"?>
-<p:sld xmlns:a="http://schemas.openxmlformats.org/drawingml/2006/main" xmlns:r="http://schemas.openxmlformats.org/officeDocument/2006/relationships" xmlns:mc="http://schemas.openxmlformats.org/markup-compatibility/2006" xmlns:mv="urn:schemas-microsoft-com:mac:vml" xmlns:p="http://schemas.openxmlformats.org/presentationml/2006/main" mc:Ignorable="mv" mc:PreserveAttributes="mv:*" showMasterPhAnim="0" show="0">
+<p:sld xmlns:a="http://schemas.openxmlformats.org/drawingml/2006/main" xmlns:r="http://schemas.openxmlformats.org/officeDocument/2006/relationships" xmlns:mc="http://schemas.openxmlformats.org/markup-compatibility/2006" xmlns:mv="urn:schemas-microsoft-com:mac:vml" xmlns:p="http://schemas.openxmlformats.org/presentationml/2006/main" mc:Ignorable="mv" mc:PreserveAttributes="mv:*" showMasterPhAnim="0">
   <p:cSld>
     <p:spTree>
       <p:nvGrpSpPr>

</xml_diff>